<commit_message>
Objects tuples and enum
</commit_message>
<xml_diff>
--- a/PPT/TypeScriptv2.pptx
+++ b/PPT/TypeScriptv2.pptx
@@ -5,7 +5,7 @@
     <p:sldMasterId id="2147483660" r:id="rId1"/>
   </p:sldMasterIdLst>
   <p:notesMasterIdLst>
-    <p:notesMasterId r:id="rId20"/>
+    <p:notesMasterId r:id="rId21"/>
   </p:notesMasterIdLst>
   <p:sldIdLst>
     <p:sldId id="256" r:id="rId2"/>
@@ -25,7 +25,8 @@
     <p:sldId id="369" r:id="rId16"/>
     <p:sldId id="370" r:id="rId17"/>
     <p:sldId id="374" r:id="rId18"/>
-    <p:sldId id="268" r:id="rId19"/>
+    <p:sldId id="375" r:id="rId19"/>
+    <p:sldId id="268" r:id="rId20"/>
   </p:sldIdLst>
   <p:sldSz cx="12192000" cy="6858000"/>
   <p:notesSz cx="6858000" cy="9144000"/>
@@ -214,7 +215,7 @@
           <a:p>
             <a:fld id="{39CD3BCA-8732-46CA-ADDD-C24F968DBEAF}" type="datetimeFigureOut">
               <a:rPr lang="en-GB" smtClean="0"/>
-              <a:t>27/05/2020</a:t>
+              <a:t>30/05/2020</a:t>
             </a:fld>
             <a:endParaRPr lang="en-GB"/>
           </a:p>
@@ -2049,6 +2050,28 @@
             </a:r>
           </a:p>
           <a:p>
+            <a:r>
+              <a:rPr lang="en-IN" baseline="0" dirty="0" smtClean="0"/>
+              <a:t>An object in </a:t>
+            </a:r>
+            <a:r>
+              <a:rPr lang="en-IN" baseline="0" dirty="0" err="1" smtClean="0"/>
+              <a:t>js</a:t>
+            </a:r>
+            <a:r>
+              <a:rPr lang="en-IN" baseline="0" dirty="0" smtClean="0"/>
+              <a:t> looks like {key : value}.All </a:t>
+            </a:r>
+            <a:r>
+              <a:rPr lang="en-IN" baseline="0" dirty="0" err="1" smtClean="0"/>
+              <a:t>js</a:t>
+            </a:r>
+            <a:r>
+              <a:rPr lang="en-IN" baseline="0" dirty="0" smtClean="0"/>
+              <a:t> objects are supported although more specific type of objects are also present in TS.</a:t>
+            </a:r>
+          </a:p>
+          <a:p>
             <a:endParaRPr lang="en-IN" baseline="0" dirty="0" smtClean="0"/>
           </a:p>
           <a:p>
@@ -2464,6 +2487,293 @@
     <p:extLst>
       <p:ext uri="{BB962C8B-B14F-4D97-AF65-F5344CB8AC3E}">
         <p14:creationId xmlns:p14="http://schemas.microsoft.com/office/powerpoint/2010/main" val="4292907215"/>
+      </p:ext>
+    </p:extLst>
+  </p:cSld>
+  <p:clrMapOvr>
+    <a:masterClrMapping/>
+  </p:clrMapOvr>
+</p:notes>
+</file>
+
+<file path=ppt/notesSlides/notesSlide9.xml><?xml version="1.0" encoding="utf-8"?>
+<p:notes xmlns:a="http://schemas.openxmlformats.org/drawingml/2006/main" xmlns:r="http://schemas.openxmlformats.org/officeDocument/2006/relationships" xmlns:p="http://schemas.openxmlformats.org/presentationml/2006/main">
+  <p:cSld>
+    <p:spTree>
+      <p:nvGrpSpPr>
+        <p:cNvPr id="1" name=""/>
+        <p:cNvGrpSpPr/>
+        <p:nvPr/>
+      </p:nvGrpSpPr>
+      <p:grpSpPr>
+        <a:xfrm>
+          <a:off x="0" y="0"/>
+          <a:ext cx="0" cy="0"/>
+          <a:chOff x="0" y="0"/>
+          <a:chExt cx="0" cy="0"/>
+        </a:xfrm>
+      </p:grpSpPr>
+      <p:sp>
+        <p:nvSpPr>
+          <p:cNvPr id="2" name="Slide Image Placeholder 1"/>
+          <p:cNvSpPr>
+            <a:spLocks noGrp="1" noRot="1" noChangeAspect="1"/>
+          </p:cNvSpPr>
+          <p:nvPr>
+            <p:ph type="sldImg"/>
+          </p:nvPr>
+        </p:nvSpPr>
+        <p:spPr/>
+      </p:sp>
+      <p:sp>
+        <p:nvSpPr>
+          <p:cNvPr id="3" name="Notes Placeholder 2"/>
+          <p:cNvSpPr>
+            <a:spLocks noGrp="1"/>
+          </p:cNvSpPr>
+          <p:nvPr>
+            <p:ph type="body" idx="1"/>
+          </p:nvPr>
+        </p:nvSpPr>
+        <p:spPr/>
+        <p:txBody>
+          <a:bodyPr/>
+          <a:lstStyle/>
+          <a:p>
+            <a:r>
+              <a:rPr lang="en-IN" dirty="0" err="1" smtClean="0"/>
+              <a:t>Ts</a:t>
+            </a:r>
+            <a:r>
+              <a:rPr lang="en-IN" dirty="0" smtClean="0"/>
+              <a:t> also adds some types which are not known to Vanilla </a:t>
+            </a:r>
+            <a:r>
+              <a:rPr lang="en-IN" dirty="0" err="1" smtClean="0"/>
+              <a:t>js</a:t>
+            </a:r>
+            <a:endParaRPr lang="en-IN" dirty="0" smtClean="0"/>
+          </a:p>
+          <a:p>
+            <a:endParaRPr lang="en-IN" dirty="0" smtClean="0"/>
+          </a:p>
+          <a:p>
+            <a:r>
+              <a:rPr lang="en-IN" dirty="0" smtClean="0"/>
+              <a:t>Tuples:</a:t>
+            </a:r>
+          </a:p>
+          <a:p>
+            <a:pPr marL="0" marR="0" lvl="0" indent="0" algn="l" defTabSz="914400" rtl="0" eaLnBrk="1" fontAlgn="auto" latinLnBrk="0" hangingPunct="1">
+              <a:lnSpc>
+                <a:spcPct val="100000"/>
+              </a:lnSpc>
+              <a:spcBef>
+                <a:spcPts val="0"/>
+              </a:spcBef>
+              <a:spcAft>
+                <a:spcPts val="0"/>
+              </a:spcAft>
+              <a:buClrTx/>
+              <a:buSzTx/>
+              <a:buFontTx/>
+              <a:buNone/>
+              <a:tabLst/>
+              <a:defRPr/>
+            </a:pPr>
+            <a:r>
+              <a:rPr lang="en-IN" dirty="0" smtClean="0">
+                <a:solidFill>
+                  <a:srgbClr val="7131A1"/>
+                </a:solidFill>
+              </a:rPr>
+              <a:t>Used when we have exactly x no of variables in an array and we know the type of each</a:t>
+            </a:r>
+            <a:endParaRPr lang="en-GB" dirty="0" smtClean="0">
+              <a:solidFill>
+                <a:srgbClr val="7131A1"/>
+              </a:solidFill>
+            </a:endParaRPr>
+          </a:p>
+          <a:p>
+            <a:r>
+              <a:rPr lang="en-IN" dirty="0" smtClean="0"/>
+              <a:t>Length check and type check of </a:t>
+            </a:r>
+            <a:r>
+              <a:rPr lang="en-IN" dirty="0" err="1" smtClean="0"/>
+              <a:t>varaiables</a:t>
+            </a:r>
+            <a:r>
+              <a:rPr lang="en-IN" baseline="0" dirty="0" smtClean="0"/>
+              <a:t> inside the tuple is enforce</a:t>
+            </a:r>
+          </a:p>
+          <a:p>
+            <a:r>
+              <a:rPr lang="en-IN" baseline="0" dirty="0" smtClean="0"/>
+              <a:t>Only one exception is when we use push which can override this check</a:t>
+            </a:r>
+          </a:p>
+          <a:p>
+            <a:r>
+              <a:rPr lang="en-IN" baseline="0" dirty="0" smtClean="0"/>
+              <a:t>Push is a mechanism to add an element to the end of an  array in </a:t>
+            </a:r>
+            <a:r>
+              <a:rPr lang="en-IN" baseline="0" dirty="0" err="1" smtClean="0"/>
+              <a:t>js</a:t>
+            </a:r>
+            <a:r>
+              <a:rPr lang="en-IN" baseline="0" dirty="0" smtClean="0"/>
+              <a:t>/</a:t>
+            </a:r>
+            <a:r>
+              <a:rPr lang="en-IN" baseline="0" dirty="0" err="1" smtClean="0"/>
+              <a:t>ts</a:t>
+            </a:r>
+            <a:endParaRPr lang="en-IN" baseline="0" dirty="0" smtClean="0"/>
+          </a:p>
+          <a:p>
+            <a:r>
+              <a:rPr lang="en-IN" baseline="0" dirty="0" smtClean="0"/>
+              <a:t>It works as a fixed length fixed types array</a:t>
+            </a:r>
+          </a:p>
+          <a:p>
+            <a:r>
+              <a:rPr lang="en-IN" baseline="0" dirty="0" smtClean="0"/>
+              <a:t>Converted to array after compilation to </a:t>
+            </a:r>
+            <a:r>
+              <a:rPr lang="en-IN" baseline="0" dirty="0" err="1" smtClean="0"/>
+              <a:t>js</a:t>
+            </a:r>
+            <a:endParaRPr lang="en-IN" baseline="0" dirty="0" smtClean="0"/>
+          </a:p>
+          <a:p>
+            <a:endParaRPr lang="en-IN" baseline="0" dirty="0" smtClean="0"/>
+          </a:p>
+          <a:p>
+            <a:r>
+              <a:rPr lang="en-IN" baseline="0" dirty="0" err="1" smtClean="0"/>
+              <a:t>Enums</a:t>
+            </a:r>
+            <a:r>
+              <a:rPr lang="en-IN" baseline="0" dirty="0" smtClean="0"/>
+              <a:t>:</a:t>
+            </a:r>
+          </a:p>
+          <a:p>
+            <a:r>
+              <a:rPr lang="en-IN" baseline="0" dirty="0" smtClean="0"/>
+              <a:t>Global constants to which we can assign numbers or human readable labels</a:t>
+            </a:r>
+          </a:p>
+          <a:p>
+            <a:r>
+              <a:rPr lang="en-IN" baseline="0" dirty="0" err="1" smtClean="0"/>
+              <a:t>Js</a:t>
+            </a:r>
+            <a:r>
+              <a:rPr lang="en-IN" baseline="0" dirty="0" smtClean="0"/>
+              <a:t> </a:t>
+            </a:r>
+            <a:r>
+              <a:rPr lang="en-IN" baseline="0" dirty="0" err="1" smtClean="0"/>
+              <a:t>dosent</a:t>
+            </a:r>
+            <a:r>
+              <a:rPr lang="en-IN" baseline="0" dirty="0" smtClean="0"/>
+              <a:t> know about </a:t>
+            </a:r>
+            <a:r>
+              <a:rPr lang="en-IN" baseline="0" dirty="0" err="1" smtClean="0"/>
+              <a:t>enums</a:t>
+            </a:r>
+            <a:endParaRPr lang="en-IN" baseline="0" dirty="0" smtClean="0"/>
+          </a:p>
+          <a:p>
+            <a:r>
+              <a:rPr lang="en-IN" baseline="0" dirty="0" smtClean="0"/>
+              <a:t>Declared using keyword </a:t>
+            </a:r>
+            <a:r>
+              <a:rPr lang="en-IN" baseline="0" dirty="0" err="1" smtClean="0"/>
+              <a:t>enum</a:t>
+            </a:r>
+            <a:r>
+              <a:rPr lang="en-IN" baseline="0" dirty="0" smtClean="0"/>
+              <a:t> followed by values in { }</a:t>
+            </a:r>
+          </a:p>
+          <a:p>
+            <a:r>
+              <a:rPr lang="en-IN" baseline="0" dirty="0" smtClean="0"/>
+              <a:t>It usually assigns numbers starting with 0 to </a:t>
+            </a:r>
+            <a:r>
+              <a:rPr lang="en-IN" baseline="0" dirty="0" err="1" smtClean="0"/>
+              <a:t>enum</a:t>
+            </a:r>
+            <a:r>
+              <a:rPr lang="en-IN" baseline="0" dirty="0" smtClean="0"/>
+              <a:t> constants</a:t>
+            </a:r>
+          </a:p>
+          <a:p>
+            <a:r>
+              <a:rPr lang="en-IN" baseline="0" dirty="0" smtClean="0"/>
+              <a:t>But we can change this and assign any numbers</a:t>
+            </a:r>
+          </a:p>
+          <a:p>
+            <a:r>
+              <a:rPr lang="en-IN" baseline="0" dirty="0" smtClean="0"/>
+              <a:t>We are not limited to numbers we can go with text also can mix types</a:t>
+            </a:r>
+          </a:p>
+          <a:p>
+            <a:endParaRPr lang="en-IN" baseline="0" dirty="0" smtClean="0"/>
+          </a:p>
+          <a:p>
+            <a:endParaRPr lang="en-IN" dirty="0" smtClean="0"/>
+          </a:p>
+          <a:p>
+            <a:endParaRPr lang="en-IN" dirty="0" smtClean="0"/>
+          </a:p>
+          <a:p>
+            <a:endParaRPr lang="en-GB" dirty="0"/>
+          </a:p>
+        </p:txBody>
+      </p:sp>
+      <p:sp>
+        <p:nvSpPr>
+          <p:cNvPr id="4" name="Slide Number Placeholder 3"/>
+          <p:cNvSpPr>
+            <a:spLocks noGrp="1"/>
+          </p:cNvSpPr>
+          <p:nvPr>
+            <p:ph type="sldNum" sz="quarter" idx="10"/>
+          </p:nvPr>
+        </p:nvSpPr>
+        <p:spPr/>
+        <p:txBody>
+          <a:bodyPr/>
+          <a:lstStyle/>
+          <a:p>
+            <a:fld id="{D3B79ED6-4970-4D84-B25C-F520A9D9210C}" type="slidenum">
+              <a:rPr lang="en-GB" smtClean="0"/>
+              <a:t>18</a:t>
+            </a:fld>
+            <a:endParaRPr lang="en-GB"/>
+          </a:p>
+        </p:txBody>
+      </p:sp>
+    </p:spTree>
+    <p:extLst>
+      <p:ext uri="{BB962C8B-B14F-4D97-AF65-F5344CB8AC3E}">
+        <p14:creationId xmlns:p14="http://schemas.microsoft.com/office/powerpoint/2010/main" val="849003334"/>
       </p:ext>
     </p:extLst>
   </p:cSld>
@@ -3195,7 +3505,7 @@
           <a:p>
             <a:fld id="{D4BA8270-C9CF-44CA-BE5A-02C2BDCCEDE4}" type="datetimeFigureOut">
               <a:rPr lang="en-GB" smtClean="0"/>
-              <a:t>27/05/2020</a:t>
+              <a:t>30/05/2020</a:t>
             </a:fld>
             <a:endParaRPr lang="en-GB"/>
           </a:p>
@@ -3446,7 +3756,7 @@
           <a:p>
             <a:fld id="{D4BA8270-C9CF-44CA-BE5A-02C2BDCCEDE4}" type="datetimeFigureOut">
               <a:rPr lang="en-GB" smtClean="0"/>
-              <a:t>27/05/2020</a:t>
+              <a:t>30/05/2020</a:t>
             </a:fld>
             <a:endParaRPr lang="en-GB"/>
           </a:p>
@@ -3760,7 +4070,7 @@
           <a:p>
             <a:fld id="{D4BA8270-C9CF-44CA-BE5A-02C2BDCCEDE4}" type="datetimeFigureOut">
               <a:rPr lang="en-GB" smtClean="0"/>
-              <a:t>27/05/2020</a:t>
+              <a:t>30/05/2020</a:t>
             </a:fld>
             <a:endParaRPr lang="en-GB"/>
           </a:p>
@@ -4101,7 +4411,7 @@
           <a:p>
             <a:fld id="{D4BA8270-C9CF-44CA-BE5A-02C2BDCCEDE4}" type="datetimeFigureOut">
               <a:rPr lang="en-GB" smtClean="0"/>
-              <a:t>27/05/2020</a:t>
+              <a:t>30/05/2020</a:t>
             </a:fld>
             <a:endParaRPr lang="en-GB"/>
           </a:p>
@@ -4415,7 +4725,7 @@
           <a:p>
             <a:fld id="{D4BA8270-C9CF-44CA-BE5A-02C2BDCCEDE4}" type="datetimeFigureOut">
               <a:rPr lang="en-GB" smtClean="0"/>
-              <a:t>27/05/2020</a:t>
+              <a:t>30/05/2020</a:t>
             </a:fld>
             <a:endParaRPr lang="en-GB"/>
           </a:p>
@@ -4808,7 +5118,7 @@
           <a:p>
             <a:fld id="{D4BA8270-C9CF-44CA-BE5A-02C2BDCCEDE4}" type="datetimeFigureOut">
               <a:rPr lang="en-GB" smtClean="0"/>
-              <a:t>27/05/2020</a:t>
+              <a:t>30/05/2020</a:t>
             </a:fld>
             <a:endParaRPr lang="en-GB"/>
           </a:p>
@@ -4978,7 +5288,7 @@
           <a:p>
             <a:fld id="{D4BA8270-C9CF-44CA-BE5A-02C2BDCCEDE4}" type="datetimeFigureOut">
               <a:rPr lang="en-GB" smtClean="0"/>
-              <a:t>27/05/2020</a:t>
+              <a:t>30/05/2020</a:t>
             </a:fld>
             <a:endParaRPr lang="en-GB"/>
           </a:p>
@@ -5158,7 +5468,7 @@
           <a:p>
             <a:fld id="{D4BA8270-C9CF-44CA-BE5A-02C2BDCCEDE4}" type="datetimeFigureOut">
               <a:rPr lang="en-GB" smtClean="0"/>
-              <a:t>27/05/2020</a:t>
+              <a:t>30/05/2020</a:t>
             </a:fld>
             <a:endParaRPr lang="en-GB"/>
           </a:p>
@@ -5334,7 +5644,7 @@
           <a:p>
             <a:fld id="{D4BA8270-C9CF-44CA-BE5A-02C2BDCCEDE4}" type="datetimeFigureOut">
               <a:rPr lang="en-GB" smtClean="0"/>
-              <a:t>27/05/2020</a:t>
+              <a:t>30/05/2020</a:t>
             </a:fld>
             <a:endParaRPr lang="en-GB"/>
           </a:p>
@@ -5581,7 +5891,7 @@
           <a:p>
             <a:fld id="{D4BA8270-C9CF-44CA-BE5A-02C2BDCCEDE4}" type="datetimeFigureOut">
               <a:rPr lang="en-GB" smtClean="0"/>
-              <a:t>27/05/2020</a:t>
+              <a:t>30/05/2020</a:t>
             </a:fld>
             <a:endParaRPr lang="en-GB"/>
           </a:p>
@@ -5813,7 +6123,7 @@
           <a:p>
             <a:fld id="{D4BA8270-C9CF-44CA-BE5A-02C2BDCCEDE4}" type="datetimeFigureOut">
               <a:rPr lang="en-GB" smtClean="0"/>
-              <a:t>27/05/2020</a:t>
+              <a:t>30/05/2020</a:t>
             </a:fld>
             <a:endParaRPr lang="en-GB"/>
           </a:p>
@@ -6187,7 +6497,7 @@
           <a:p>
             <a:fld id="{D4BA8270-C9CF-44CA-BE5A-02C2BDCCEDE4}" type="datetimeFigureOut">
               <a:rPr lang="en-GB" smtClean="0"/>
-              <a:t>27/05/2020</a:t>
+              <a:t>30/05/2020</a:t>
             </a:fld>
             <a:endParaRPr lang="en-GB"/>
           </a:p>
@@ -6310,7 +6620,7 @@
           <a:p>
             <a:fld id="{D4BA8270-C9CF-44CA-BE5A-02C2BDCCEDE4}" type="datetimeFigureOut">
               <a:rPr lang="en-GB" smtClean="0"/>
-              <a:t>27/05/2020</a:t>
+              <a:t>30/05/2020</a:t>
             </a:fld>
             <a:endParaRPr lang="en-GB"/>
           </a:p>
@@ -6405,7 +6715,7 @@
           <a:p>
             <a:fld id="{D4BA8270-C9CF-44CA-BE5A-02C2BDCCEDE4}" type="datetimeFigureOut">
               <a:rPr lang="en-GB" smtClean="0"/>
-              <a:t>27/05/2020</a:t>
+              <a:t>30/05/2020</a:t>
             </a:fld>
             <a:endParaRPr lang="en-GB"/>
           </a:p>
@@ -6660,7 +6970,7 @@
           <a:p>
             <a:fld id="{D4BA8270-C9CF-44CA-BE5A-02C2BDCCEDE4}" type="datetimeFigureOut">
               <a:rPr lang="en-GB" smtClean="0"/>
-              <a:t>27/05/2020</a:t>
+              <a:t>30/05/2020</a:t>
             </a:fld>
             <a:endParaRPr lang="en-GB"/>
           </a:p>
@@ -6923,7 +7233,7 @@
           <a:p>
             <a:fld id="{D4BA8270-C9CF-44CA-BE5A-02C2BDCCEDE4}" type="datetimeFigureOut">
               <a:rPr lang="en-GB" smtClean="0"/>
-              <a:t>27/05/2020</a:t>
+              <a:t>30/05/2020</a:t>
             </a:fld>
             <a:endParaRPr lang="en-GB"/>
           </a:p>
@@ -7666,7 +7976,7 @@
           <a:p>
             <a:fld id="{D4BA8270-C9CF-44CA-BE5A-02C2BDCCEDE4}" type="datetimeFigureOut">
               <a:rPr lang="en-GB" smtClean="0"/>
-              <a:t>27/05/2020</a:t>
+              <a:t>30/05/2020</a:t>
             </a:fld>
             <a:endParaRPr lang="en-GB"/>
           </a:p>
@@ -11895,7 +12205,7 @@
         </p:nvSpPr>
         <p:spPr>
           <a:xfrm>
-            <a:off x="522787" y="3669175"/>
+            <a:off x="565226" y="4826675"/>
             <a:ext cx="9280970" cy="2031325"/>
           </a:xfrm>
           <a:prstGeom prst="rect">
@@ -11945,6 +12255,395 @@
               <a:t>The core primitive types in TypeScript are all lowercase!</a:t>
             </a:r>
             <a:endParaRPr lang="en-GB" dirty="0"/>
+          </a:p>
+        </p:txBody>
+      </p:sp>
+      <p:sp>
+        <p:nvSpPr>
+          <p:cNvPr id="13" name="Rectangle 12"/>
+          <p:cNvSpPr/>
+          <p:nvPr/>
+        </p:nvSpPr>
+        <p:spPr>
+          <a:xfrm flipH="1">
+            <a:off x="522787" y="3307360"/>
+            <a:ext cx="2511706" cy="608738"/>
+          </a:xfrm>
+          <a:prstGeom prst="rect">
+            <a:avLst/>
+          </a:prstGeom>
+          <a:solidFill>
+            <a:srgbClr val="7030A0"/>
+          </a:solidFill>
+        </p:spPr>
+        <p:style>
+          <a:lnRef idx="2">
+            <a:schemeClr val="accent1">
+              <a:shade val="50000"/>
+            </a:schemeClr>
+          </a:lnRef>
+          <a:fillRef idx="1">
+            <a:schemeClr val="accent1"/>
+          </a:fillRef>
+          <a:effectRef idx="0">
+            <a:schemeClr val="accent1"/>
+          </a:effectRef>
+          <a:fontRef idx="minor">
+            <a:schemeClr val="lt1"/>
+          </a:fontRef>
+        </p:style>
+        <p:txBody>
+          <a:bodyPr rtlCol="0" anchor="ctr"/>
+          <a:lstStyle/>
+          <a:p>
+            <a:pPr algn="ctr"/>
+            <a:r>
+              <a:rPr lang="en-GB" dirty="0" smtClean="0"/>
+              <a:t>Object</a:t>
+            </a:r>
+            <a:endParaRPr lang="en-GB" dirty="0"/>
+          </a:p>
+        </p:txBody>
+      </p:sp>
+      <p:sp>
+        <p:nvSpPr>
+          <p:cNvPr id="15" name="Rectangle 14"/>
+          <p:cNvSpPr/>
+          <p:nvPr/>
+        </p:nvSpPr>
+        <p:spPr>
+          <a:xfrm flipH="1">
+            <a:off x="3441536" y="3307360"/>
+            <a:ext cx="2511706" cy="608738"/>
+          </a:xfrm>
+          <a:prstGeom prst="rect">
+            <a:avLst/>
+          </a:prstGeom>
+          <a:solidFill>
+            <a:srgbClr val="D1B3E7"/>
+          </a:solidFill>
+        </p:spPr>
+        <p:style>
+          <a:lnRef idx="2">
+            <a:schemeClr val="accent1">
+              <a:shade val="50000"/>
+            </a:schemeClr>
+          </a:lnRef>
+          <a:fillRef idx="1">
+            <a:schemeClr val="accent1"/>
+          </a:fillRef>
+          <a:effectRef idx="0">
+            <a:schemeClr val="accent1"/>
+          </a:effectRef>
+          <a:fontRef idx="minor">
+            <a:schemeClr val="lt1"/>
+          </a:fontRef>
+        </p:style>
+        <p:txBody>
+          <a:bodyPr rtlCol="0" anchor="ctr"/>
+          <a:lstStyle/>
+          <a:p>
+            <a:pPr algn="ctr"/>
+            <a:r>
+              <a:rPr lang="en-GB" dirty="0" smtClean="0">
+                <a:solidFill>
+                  <a:srgbClr val="7030A0"/>
+                </a:solidFill>
+              </a:rPr>
+              <a:t>{age: 30}</a:t>
+            </a:r>
+            <a:endParaRPr lang="en-GB" dirty="0">
+              <a:solidFill>
+                <a:srgbClr val="7030A0"/>
+              </a:solidFill>
+            </a:endParaRPr>
+          </a:p>
+        </p:txBody>
+      </p:sp>
+      <p:sp>
+        <p:nvSpPr>
+          <p:cNvPr id="16" name="Rectangle 15"/>
+          <p:cNvSpPr/>
+          <p:nvPr/>
+        </p:nvSpPr>
+        <p:spPr>
+          <a:xfrm flipH="1">
+            <a:off x="6267684" y="3307360"/>
+            <a:ext cx="5123727" cy="608738"/>
+          </a:xfrm>
+          <a:prstGeom prst="rect">
+            <a:avLst/>
+          </a:prstGeom>
+          <a:solidFill>
+            <a:srgbClr val="D1B3E7"/>
+          </a:solidFill>
+        </p:spPr>
+        <p:style>
+          <a:lnRef idx="2">
+            <a:schemeClr val="accent1">
+              <a:shade val="50000"/>
+            </a:schemeClr>
+          </a:lnRef>
+          <a:fillRef idx="1">
+            <a:schemeClr val="accent1"/>
+          </a:fillRef>
+          <a:effectRef idx="0">
+            <a:schemeClr val="accent1"/>
+          </a:effectRef>
+          <a:fontRef idx="minor">
+            <a:schemeClr val="lt1"/>
+          </a:fontRef>
+        </p:style>
+        <p:txBody>
+          <a:bodyPr rtlCol="0" anchor="ctr"/>
+          <a:lstStyle/>
+          <a:p>
+            <a:pPr algn="ctr"/>
+            <a:r>
+              <a:rPr lang="en-GB" dirty="0" smtClean="0">
+                <a:solidFill>
+                  <a:srgbClr val="7131A1"/>
+                </a:solidFill>
+              </a:rPr>
+              <a:t>Any </a:t>
+            </a:r>
+            <a:r>
+              <a:rPr lang="en-GB" dirty="0" err="1" smtClean="0">
+                <a:solidFill>
+                  <a:srgbClr val="7131A1"/>
+                </a:solidFill>
+              </a:rPr>
+              <a:t>javascript</a:t>
+            </a:r>
+            <a:r>
+              <a:rPr lang="en-GB" dirty="0" smtClean="0">
+                <a:solidFill>
+                  <a:srgbClr val="7131A1"/>
+                </a:solidFill>
+              </a:rPr>
+              <a:t> Object is </a:t>
+            </a:r>
+            <a:r>
+              <a:rPr lang="en-GB" dirty="0" err="1" smtClean="0">
+                <a:solidFill>
+                  <a:srgbClr val="7131A1"/>
+                </a:solidFill>
+              </a:rPr>
+              <a:t>supported,more</a:t>
+            </a:r>
+            <a:r>
+              <a:rPr lang="en-GB" dirty="0" smtClean="0">
+                <a:solidFill>
+                  <a:srgbClr val="7131A1"/>
+                </a:solidFill>
+              </a:rPr>
+              <a:t> specific </a:t>
+            </a:r>
+            <a:r>
+              <a:rPr lang="en-GB" dirty="0" err="1" smtClean="0">
+                <a:solidFill>
+                  <a:srgbClr val="7131A1"/>
+                </a:solidFill>
+              </a:rPr>
+              <a:t>typeof</a:t>
+            </a:r>
+            <a:r>
+              <a:rPr lang="en-GB" dirty="0" smtClean="0">
+                <a:solidFill>
+                  <a:srgbClr val="7131A1"/>
+                </a:solidFill>
+              </a:rPr>
+              <a:t> objects are possible</a:t>
+            </a:r>
+            <a:endParaRPr lang="en-GB" dirty="0">
+              <a:solidFill>
+                <a:srgbClr val="7131A1"/>
+              </a:solidFill>
+            </a:endParaRPr>
+          </a:p>
+        </p:txBody>
+      </p:sp>
+      <p:sp>
+        <p:nvSpPr>
+          <p:cNvPr id="17" name="Rectangle 16"/>
+          <p:cNvSpPr/>
+          <p:nvPr/>
+        </p:nvSpPr>
+        <p:spPr>
+          <a:xfrm flipH="1">
+            <a:off x="565226" y="4131784"/>
+            <a:ext cx="2511706" cy="486136"/>
+          </a:xfrm>
+          <a:prstGeom prst="rect">
+            <a:avLst/>
+          </a:prstGeom>
+          <a:solidFill>
+            <a:srgbClr val="7030A0"/>
+          </a:solidFill>
+        </p:spPr>
+        <p:style>
+          <a:lnRef idx="2">
+            <a:schemeClr val="accent1">
+              <a:shade val="50000"/>
+            </a:schemeClr>
+          </a:lnRef>
+          <a:fillRef idx="1">
+            <a:schemeClr val="accent1"/>
+          </a:fillRef>
+          <a:effectRef idx="0">
+            <a:schemeClr val="accent1"/>
+          </a:effectRef>
+          <a:fontRef idx="minor">
+            <a:schemeClr val="lt1"/>
+          </a:fontRef>
+        </p:style>
+        <p:txBody>
+          <a:bodyPr rtlCol="0" anchor="ctr"/>
+          <a:lstStyle/>
+          <a:p>
+            <a:pPr algn="ctr"/>
+            <a:r>
+              <a:rPr lang="en-GB" dirty="0" smtClean="0"/>
+              <a:t>Arrays</a:t>
+            </a:r>
+            <a:endParaRPr lang="en-GB" dirty="0"/>
+          </a:p>
+        </p:txBody>
+      </p:sp>
+      <p:sp>
+        <p:nvSpPr>
+          <p:cNvPr id="18" name="Rectangle 17"/>
+          <p:cNvSpPr/>
+          <p:nvPr/>
+        </p:nvSpPr>
+        <p:spPr>
+          <a:xfrm flipH="1">
+            <a:off x="3483975" y="4131784"/>
+            <a:ext cx="2511706" cy="486136"/>
+          </a:xfrm>
+          <a:prstGeom prst="rect">
+            <a:avLst/>
+          </a:prstGeom>
+          <a:solidFill>
+            <a:srgbClr val="D1B3E7"/>
+          </a:solidFill>
+        </p:spPr>
+        <p:style>
+          <a:lnRef idx="2">
+            <a:schemeClr val="accent1">
+              <a:shade val="50000"/>
+            </a:schemeClr>
+          </a:lnRef>
+          <a:fillRef idx="1">
+            <a:schemeClr val="accent1"/>
+          </a:fillRef>
+          <a:effectRef idx="0">
+            <a:schemeClr val="accent1"/>
+          </a:effectRef>
+          <a:fontRef idx="minor">
+            <a:schemeClr val="lt1"/>
+          </a:fontRef>
+        </p:style>
+        <p:txBody>
+          <a:bodyPr rtlCol="0" anchor="ctr"/>
+          <a:lstStyle/>
+          <a:p>
+            <a:pPr algn="ctr"/>
+            <a:r>
+              <a:rPr lang="en-GB" dirty="0" smtClean="0">
+                <a:solidFill>
+                  <a:srgbClr val="7030A0"/>
+                </a:solidFill>
+              </a:rPr>
+              <a:t>[1,2,3]</a:t>
+            </a:r>
+            <a:endParaRPr lang="en-GB" dirty="0">
+              <a:solidFill>
+                <a:srgbClr val="7030A0"/>
+              </a:solidFill>
+            </a:endParaRPr>
+          </a:p>
+        </p:txBody>
+      </p:sp>
+      <p:sp>
+        <p:nvSpPr>
+          <p:cNvPr id="19" name="Rectangle 18"/>
+          <p:cNvSpPr/>
+          <p:nvPr/>
+        </p:nvSpPr>
+        <p:spPr>
+          <a:xfrm flipH="1">
+            <a:off x="6310123" y="4131784"/>
+            <a:ext cx="5123727" cy="1094972"/>
+          </a:xfrm>
+          <a:prstGeom prst="rect">
+            <a:avLst/>
+          </a:prstGeom>
+          <a:solidFill>
+            <a:srgbClr val="D1B3E7"/>
+          </a:solidFill>
+        </p:spPr>
+        <p:style>
+          <a:lnRef idx="2">
+            <a:schemeClr val="accent1">
+              <a:shade val="50000"/>
+            </a:schemeClr>
+          </a:lnRef>
+          <a:fillRef idx="1">
+            <a:schemeClr val="accent1"/>
+          </a:fillRef>
+          <a:effectRef idx="0">
+            <a:schemeClr val="accent1"/>
+          </a:effectRef>
+          <a:fontRef idx="minor">
+            <a:schemeClr val="lt1"/>
+          </a:fontRef>
+        </p:style>
+        <p:txBody>
+          <a:bodyPr rtlCol="0" anchor="ctr"/>
+          <a:lstStyle/>
+          <a:p>
+            <a:pPr algn="ctr"/>
+            <a:r>
+              <a:rPr lang="en-GB" dirty="0" smtClean="0">
+                <a:solidFill>
+                  <a:srgbClr val="7131A1"/>
+                </a:solidFill>
+              </a:rPr>
+              <a:t>Any data can be saved in arrays numbers string other arrays </a:t>
+            </a:r>
+            <a:r>
+              <a:rPr lang="en-GB" dirty="0" err="1" smtClean="0">
+                <a:solidFill>
+                  <a:srgbClr val="7131A1"/>
+                </a:solidFill>
+              </a:rPr>
+              <a:t>etc</a:t>
+            </a:r>
+            <a:r>
+              <a:rPr lang="en-GB" dirty="0" smtClean="0">
+                <a:solidFill>
+                  <a:srgbClr val="7131A1"/>
+                </a:solidFill>
+              </a:rPr>
+              <a:t> we can also have mixed data,</a:t>
+            </a:r>
+          </a:p>
+          <a:p>
+            <a:pPr algn="ctr"/>
+            <a:r>
+              <a:rPr lang="en-IN" dirty="0" smtClean="0">
+                <a:solidFill>
+                  <a:srgbClr val="7131A1"/>
+                </a:solidFill>
+              </a:rPr>
+              <a:t>Types can be flexible or strict</a:t>
+            </a:r>
+            <a:endParaRPr lang="en-GB" dirty="0">
+              <a:solidFill>
+                <a:srgbClr val="7131A1"/>
+              </a:solidFill>
+            </a:endParaRPr>
           </a:p>
         </p:txBody>
       </p:sp>
@@ -12798,7 +13497,7 @@
                             </p:stCondLst>
                             <p:childTnLst>
                               <p:par>
-                                <p:cTn id="59" presetID="1" presetClass="entr" presetSubtype="0" fill="hold" grpId="0" nodeType="clickEffect">
+                                <p:cTn id="59" presetID="2" presetClass="entr" presetSubtype="4" fill="hold" grpId="0" nodeType="clickEffect">
                                   <p:stCondLst>
                                     <p:cond delay="0"/>
                                   </p:stCondLst>
@@ -12806,6 +13505,552 @@
                                     <p:set>
                                       <p:cBhvr>
                                         <p:cTn id="60" dur="1" fill="hold">
+                                          <p:stCondLst>
+                                            <p:cond delay="0"/>
+                                          </p:stCondLst>
+                                        </p:cTn>
+                                        <p:tgtEl>
+                                          <p:spTgt spid="13"/>
+                                        </p:tgtEl>
+                                        <p:attrNameLst>
+                                          <p:attrName>style.visibility</p:attrName>
+                                        </p:attrNameLst>
+                                      </p:cBhvr>
+                                      <p:to>
+                                        <p:strVal val="visible"/>
+                                      </p:to>
+                                    </p:set>
+                                    <p:anim calcmode="lin" valueType="num">
+                                      <p:cBhvr additive="base">
+                                        <p:cTn id="61" dur="500" fill="hold"/>
+                                        <p:tgtEl>
+                                          <p:spTgt spid="13"/>
+                                        </p:tgtEl>
+                                        <p:attrNameLst>
+                                          <p:attrName>ppt_x</p:attrName>
+                                        </p:attrNameLst>
+                                      </p:cBhvr>
+                                      <p:tavLst>
+                                        <p:tav tm="0">
+                                          <p:val>
+                                            <p:strVal val="#ppt_x"/>
+                                          </p:val>
+                                        </p:tav>
+                                        <p:tav tm="100000">
+                                          <p:val>
+                                            <p:strVal val="#ppt_x"/>
+                                          </p:val>
+                                        </p:tav>
+                                      </p:tavLst>
+                                    </p:anim>
+                                    <p:anim calcmode="lin" valueType="num">
+                                      <p:cBhvr additive="base">
+                                        <p:cTn id="62" dur="500" fill="hold"/>
+                                        <p:tgtEl>
+                                          <p:spTgt spid="13"/>
+                                        </p:tgtEl>
+                                        <p:attrNameLst>
+                                          <p:attrName>ppt_y</p:attrName>
+                                        </p:attrNameLst>
+                                      </p:cBhvr>
+                                      <p:tavLst>
+                                        <p:tav tm="0">
+                                          <p:val>
+                                            <p:strVal val="1+#ppt_h/2"/>
+                                          </p:val>
+                                        </p:tav>
+                                        <p:tav tm="100000">
+                                          <p:val>
+                                            <p:strVal val="#ppt_y"/>
+                                          </p:val>
+                                        </p:tav>
+                                      </p:tavLst>
+                                    </p:anim>
+                                  </p:childTnLst>
+                                </p:cTn>
+                              </p:par>
+                            </p:childTnLst>
+                          </p:cTn>
+                        </p:par>
+                      </p:childTnLst>
+                    </p:cTn>
+                  </p:par>
+                  <p:par>
+                    <p:cTn id="63" fill="hold">
+                      <p:stCondLst>
+                        <p:cond delay="indefinite"/>
+                      </p:stCondLst>
+                      <p:childTnLst>
+                        <p:par>
+                          <p:cTn id="64" fill="hold">
+                            <p:stCondLst>
+                              <p:cond delay="0"/>
+                            </p:stCondLst>
+                            <p:childTnLst>
+                              <p:par>
+                                <p:cTn id="65" presetID="2" presetClass="entr" presetSubtype="4" fill="hold" grpId="0" nodeType="clickEffect">
+                                  <p:stCondLst>
+                                    <p:cond delay="0"/>
+                                  </p:stCondLst>
+                                  <p:childTnLst>
+                                    <p:set>
+                                      <p:cBhvr>
+                                        <p:cTn id="66" dur="1" fill="hold">
+                                          <p:stCondLst>
+                                            <p:cond delay="0"/>
+                                          </p:stCondLst>
+                                        </p:cTn>
+                                        <p:tgtEl>
+                                          <p:spTgt spid="15"/>
+                                        </p:tgtEl>
+                                        <p:attrNameLst>
+                                          <p:attrName>style.visibility</p:attrName>
+                                        </p:attrNameLst>
+                                      </p:cBhvr>
+                                      <p:to>
+                                        <p:strVal val="visible"/>
+                                      </p:to>
+                                    </p:set>
+                                    <p:anim calcmode="lin" valueType="num">
+                                      <p:cBhvr additive="base">
+                                        <p:cTn id="67" dur="500" fill="hold"/>
+                                        <p:tgtEl>
+                                          <p:spTgt spid="15"/>
+                                        </p:tgtEl>
+                                        <p:attrNameLst>
+                                          <p:attrName>ppt_x</p:attrName>
+                                        </p:attrNameLst>
+                                      </p:cBhvr>
+                                      <p:tavLst>
+                                        <p:tav tm="0">
+                                          <p:val>
+                                            <p:strVal val="#ppt_x"/>
+                                          </p:val>
+                                        </p:tav>
+                                        <p:tav tm="100000">
+                                          <p:val>
+                                            <p:strVal val="#ppt_x"/>
+                                          </p:val>
+                                        </p:tav>
+                                      </p:tavLst>
+                                    </p:anim>
+                                    <p:anim calcmode="lin" valueType="num">
+                                      <p:cBhvr additive="base">
+                                        <p:cTn id="68" dur="500" fill="hold"/>
+                                        <p:tgtEl>
+                                          <p:spTgt spid="15"/>
+                                        </p:tgtEl>
+                                        <p:attrNameLst>
+                                          <p:attrName>ppt_y</p:attrName>
+                                        </p:attrNameLst>
+                                      </p:cBhvr>
+                                      <p:tavLst>
+                                        <p:tav tm="0">
+                                          <p:val>
+                                            <p:strVal val="1+#ppt_h/2"/>
+                                          </p:val>
+                                        </p:tav>
+                                        <p:tav tm="100000">
+                                          <p:val>
+                                            <p:strVal val="#ppt_y"/>
+                                          </p:val>
+                                        </p:tav>
+                                      </p:tavLst>
+                                    </p:anim>
+                                  </p:childTnLst>
+                                </p:cTn>
+                              </p:par>
+                            </p:childTnLst>
+                          </p:cTn>
+                        </p:par>
+                      </p:childTnLst>
+                    </p:cTn>
+                  </p:par>
+                  <p:par>
+                    <p:cTn id="69" fill="hold">
+                      <p:stCondLst>
+                        <p:cond delay="indefinite"/>
+                      </p:stCondLst>
+                      <p:childTnLst>
+                        <p:par>
+                          <p:cTn id="70" fill="hold">
+                            <p:stCondLst>
+                              <p:cond delay="0"/>
+                            </p:stCondLst>
+                            <p:childTnLst>
+                              <p:par>
+                                <p:cTn id="71" presetID="2" presetClass="entr" presetSubtype="4" fill="hold" grpId="0" nodeType="clickEffect">
+                                  <p:stCondLst>
+                                    <p:cond delay="0"/>
+                                  </p:stCondLst>
+                                  <p:childTnLst>
+                                    <p:set>
+                                      <p:cBhvr>
+                                        <p:cTn id="72" dur="1" fill="hold">
+                                          <p:stCondLst>
+                                            <p:cond delay="0"/>
+                                          </p:stCondLst>
+                                        </p:cTn>
+                                        <p:tgtEl>
+                                          <p:spTgt spid="16"/>
+                                        </p:tgtEl>
+                                        <p:attrNameLst>
+                                          <p:attrName>style.visibility</p:attrName>
+                                        </p:attrNameLst>
+                                      </p:cBhvr>
+                                      <p:to>
+                                        <p:strVal val="visible"/>
+                                      </p:to>
+                                    </p:set>
+                                    <p:anim calcmode="lin" valueType="num">
+                                      <p:cBhvr additive="base">
+                                        <p:cTn id="73" dur="500" fill="hold"/>
+                                        <p:tgtEl>
+                                          <p:spTgt spid="16"/>
+                                        </p:tgtEl>
+                                        <p:attrNameLst>
+                                          <p:attrName>ppt_x</p:attrName>
+                                        </p:attrNameLst>
+                                      </p:cBhvr>
+                                      <p:tavLst>
+                                        <p:tav tm="0">
+                                          <p:val>
+                                            <p:strVal val="#ppt_x"/>
+                                          </p:val>
+                                        </p:tav>
+                                        <p:tav tm="100000">
+                                          <p:val>
+                                            <p:strVal val="#ppt_x"/>
+                                          </p:val>
+                                        </p:tav>
+                                      </p:tavLst>
+                                    </p:anim>
+                                    <p:anim calcmode="lin" valueType="num">
+                                      <p:cBhvr additive="base">
+                                        <p:cTn id="74" dur="500" fill="hold"/>
+                                        <p:tgtEl>
+                                          <p:spTgt spid="16"/>
+                                        </p:tgtEl>
+                                        <p:attrNameLst>
+                                          <p:attrName>ppt_y</p:attrName>
+                                        </p:attrNameLst>
+                                      </p:cBhvr>
+                                      <p:tavLst>
+                                        <p:tav tm="0">
+                                          <p:val>
+                                            <p:strVal val="1+#ppt_h/2"/>
+                                          </p:val>
+                                        </p:tav>
+                                        <p:tav tm="100000">
+                                          <p:val>
+                                            <p:strVal val="#ppt_y"/>
+                                          </p:val>
+                                        </p:tav>
+                                      </p:tavLst>
+                                    </p:anim>
+                                  </p:childTnLst>
+                                </p:cTn>
+                              </p:par>
+                            </p:childTnLst>
+                          </p:cTn>
+                        </p:par>
+                      </p:childTnLst>
+                    </p:cTn>
+                  </p:par>
+                  <p:par>
+                    <p:cTn id="75" fill="hold">
+                      <p:stCondLst>
+                        <p:cond delay="indefinite"/>
+                      </p:stCondLst>
+                      <p:childTnLst>
+                        <p:par>
+                          <p:cTn id="76" fill="hold">
+                            <p:stCondLst>
+                              <p:cond delay="0"/>
+                            </p:stCondLst>
+                            <p:childTnLst>
+                              <p:par>
+                                <p:cTn id="77" presetID="2" presetClass="entr" presetSubtype="4" fill="hold" grpId="0" nodeType="clickEffect">
+                                  <p:stCondLst>
+                                    <p:cond delay="0"/>
+                                  </p:stCondLst>
+                                  <p:childTnLst>
+                                    <p:set>
+                                      <p:cBhvr>
+                                        <p:cTn id="78" dur="1" fill="hold">
+                                          <p:stCondLst>
+                                            <p:cond delay="0"/>
+                                          </p:stCondLst>
+                                        </p:cTn>
+                                        <p:tgtEl>
+                                          <p:spTgt spid="17"/>
+                                        </p:tgtEl>
+                                        <p:attrNameLst>
+                                          <p:attrName>style.visibility</p:attrName>
+                                        </p:attrNameLst>
+                                      </p:cBhvr>
+                                      <p:to>
+                                        <p:strVal val="visible"/>
+                                      </p:to>
+                                    </p:set>
+                                    <p:anim calcmode="lin" valueType="num">
+                                      <p:cBhvr additive="base">
+                                        <p:cTn id="79" dur="500" fill="hold"/>
+                                        <p:tgtEl>
+                                          <p:spTgt spid="17"/>
+                                        </p:tgtEl>
+                                        <p:attrNameLst>
+                                          <p:attrName>ppt_x</p:attrName>
+                                        </p:attrNameLst>
+                                      </p:cBhvr>
+                                      <p:tavLst>
+                                        <p:tav tm="0">
+                                          <p:val>
+                                            <p:strVal val="#ppt_x"/>
+                                          </p:val>
+                                        </p:tav>
+                                        <p:tav tm="100000">
+                                          <p:val>
+                                            <p:strVal val="#ppt_x"/>
+                                          </p:val>
+                                        </p:tav>
+                                      </p:tavLst>
+                                    </p:anim>
+                                    <p:anim calcmode="lin" valueType="num">
+                                      <p:cBhvr additive="base">
+                                        <p:cTn id="80" dur="500" fill="hold"/>
+                                        <p:tgtEl>
+                                          <p:spTgt spid="17"/>
+                                        </p:tgtEl>
+                                        <p:attrNameLst>
+                                          <p:attrName>ppt_y</p:attrName>
+                                        </p:attrNameLst>
+                                      </p:cBhvr>
+                                      <p:tavLst>
+                                        <p:tav tm="0">
+                                          <p:val>
+                                            <p:strVal val="1+#ppt_h/2"/>
+                                          </p:val>
+                                        </p:tav>
+                                        <p:tav tm="100000">
+                                          <p:val>
+                                            <p:strVal val="#ppt_y"/>
+                                          </p:val>
+                                        </p:tav>
+                                      </p:tavLst>
+                                    </p:anim>
+                                  </p:childTnLst>
+                                </p:cTn>
+                              </p:par>
+                            </p:childTnLst>
+                          </p:cTn>
+                        </p:par>
+                      </p:childTnLst>
+                    </p:cTn>
+                  </p:par>
+                  <p:par>
+                    <p:cTn id="81" fill="hold">
+                      <p:stCondLst>
+                        <p:cond delay="indefinite"/>
+                      </p:stCondLst>
+                      <p:childTnLst>
+                        <p:par>
+                          <p:cTn id="82" fill="hold">
+                            <p:stCondLst>
+                              <p:cond delay="0"/>
+                            </p:stCondLst>
+                            <p:childTnLst>
+                              <p:par>
+                                <p:cTn id="83" presetID="2" presetClass="entr" presetSubtype="4" fill="hold" grpId="0" nodeType="clickEffect">
+                                  <p:stCondLst>
+                                    <p:cond delay="0"/>
+                                  </p:stCondLst>
+                                  <p:childTnLst>
+                                    <p:set>
+                                      <p:cBhvr>
+                                        <p:cTn id="84" dur="1" fill="hold">
+                                          <p:stCondLst>
+                                            <p:cond delay="0"/>
+                                          </p:stCondLst>
+                                        </p:cTn>
+                                        <p:tgtEl>
+                                          <p:spTgt spid="18"/>
+                                        </p:tgtEl>
+                                        <p:attrNameLst>
+                                          <p:attrName>style.visibility</p:attrName>
+                                        </p:attrNameLst>
+                                      </p:cBhvr>
+                                      <p:to>
+                                        <p:strVal val="visible"/>
+                                      </p:to>
+                                    </p:set>
+                                    <p:anim calcmode="lin" valueType="num">
+                                      <p:cBhvr additive="base">
+                                        <p:cTn id="85" dur="500" fill="hold"/>
+                                        <p:tgtEl>
+                                          <p:spTgt spid="18"/>
+                                        </p:tgtEl>
+                                        <p:attrNameLst>
+                                          <p:attrName>ppt_x</p:attrName>
+                                        </p:attrNameLst>
+                                      </p:cBhvr>
+                                      <p:tavLst>
+                                        <p:tav tm="0">
+                                          <p:val>
+                                            <p:strVal val="#ppt_x"/>
+                                          </p:val>
+                                        </p:tav>
+                                        <p:tav tm="100000">
+                                          <p:val>
+                                            <p:strVal val="#ppt_x"/>
+                                          </p:val>
+                                        </p:tav>
+                                      </p:tavLst>
+                                    </p:anim>
+                                    <p:anim calcmode="lin" valueType="num">
+                                      <p:cBhvr additive="base">
+                                        <p:cTn id="86" dur="500" fill="hold"/>
+                                        <p:tgtEl>
+                                          <p:spTgt spid="18"/>
+                                        </p:tgtEl>
+                                        <p:attrNameLst>
+                                          <p:attrName>ppt_y</p:attrName>
+                                        </p:attrNameLst>
+                                      </p:cBhvr>
+                                      <p:tavLst>
+                                        <p:tav tm="0">
+                                          <p:val>
+                                            <p:strVal val="1+#ppt_h/2"/>
+                                          </p:val>
+                                        </p:tav>
+                                        <p:tav tm="100000">
+                                          <p:val>
+                                            <p:strVal val="#ppt_y"/>
+                                          </p:val>
+                                        </p:tav>
+                                      </p:tavLst>
+                                    </p:anim>
+                                  </p:childTnLst>
+                                </p:cTn>
+                              </p:par>
+                            </p:childTnLst>
+                          </p:cTn>
+                        </p:par>
+                      </p:childTnLst>
+                    </p:cTn>
+                  </p:par>
+                  <p:par>
+                    <p:cTn id="87" fill="hold">
+                      <p:stCondLst>
+                        <p:cond delay="indefinite"/>
+                      </p:stCondLst>
+                      <p:childTnLst>
+                        <p:par>
+                          <p:cTn id="88" fill="hold">
+                            <p:stCondLst>
+                              <p:cond delay="0"/>
+                            </p:stCondLst>
+                            <p:childTnLst>
+                              <p:par>
+                                <p:cTn id="89" presetID="2" presetClass="entr" presetSubtype="4" fill="hold" grpId="0" nodeType="clickEffect">
+                                  <p:stCondLst>
+                                    <p:cond delay="0"/>
+                                  </p:stCondLst>
+                                  <p:childTnLst>
+                                    <p:set>
+                                      <p:cBhvr>
+                                        <p:cTn id="90" dur="1" fill="hold">
+                                          <p:stCondLst>
+                                            <p:cond delay="0"/>
+                                          </p:stCondLst>
+                                        </p:cTn>
+                                        <p:tgtEl>
+                                          <p:spTgt spid="19"/>
+                                        </p:tgtEl>
+                                        <p:attrNameLst>
+                                          <p:attrName>style.visibility</p:attrName>
+                                        </p:attrNameLst>
+                                      </p:cBhvr>
+                                      <p:to>
+                                        <p:strVal val="visible"/>
+                                      </p:to>
+                                    </p:set>
+                                    <p:anim calcmode="lin" valueType="num">
+                                      <p:cBhvr additive="base">
+                                        <p:cTn id="91" dur="500" fill="hold"/>
+                                        <p:tgtEl>
+                                          <p:spTgt spid="19"/>
+                                        </p:tgtEl>
+                                        <p:attrNameLst>
+                                          <p:attrName>ppt_x</p:attrName>
+                                        </p:attrNameLst>
+                                      </p:cBhvr>
+                                      <p:tavLst>
+                                        <p:tav tm="0">
+                                          <p:val>
+                                            <p:strVal val="#ppt_x"/>
+                                          </p:val>
+                                        </p:tav>
+                                        <p:tav tm="100000">
+                                          <p:val>
+                                            <p:strVal val="#ppt_x"/>
+                                          </p:val>
+                                        </p:tav>
+                                      </p:tavLst>
+                                    </p:anim>
+                                    <p:anim calcmode="lin" valueType="num">
+                                      <p:cBhvr additive="base">
+                                        <p:cTn id="92" dur="500" fill="hold"/>
+                                        <p:tgtEl>
+                                          <p:spTgt spid="19"/>
+                                        </p:tgtEl>
+                                        <p:attrNameLst>
+                                          <p:attrName>ppt_y</p:attrName>
+                                        </p:attrNameLst>
+                                      </p:cBhvr>
+                                      <p:tavLst>
+                                        <p:tav tm="0">
+                                          <p:val>
+                                            <p:strVal val="1+#ppt_h/2"/>
+                                          </p:val>
+                                        </p:tav>
+                                        <p:tav tm="100000">
+                                          <p:val>
+                                            <p:strVal val="#ppt_y"/>
+                                          </p:val>
+                                        </p:tav>
+                                      </p:tavLst>
+                                    </p:anim>
+                                  </p:childTnLst>
+                                </p:cTn>
+                              </p:par>
+                            </p:childTnLst>
+                          </p:cTn>
+                        </p:par>
+                      </p:childTnLst>
+                    </p:cTn>
+                  </p:par>
+                  <p:par>
+                    <p:cTn id="93" fill="hold">
+                      <p:stCondLst>
+                        <p:cond delay="indefinite"/>
+                      </p:stCondLst>
+                      <p:childTnLst>
+                        <p:par>
+                          <p:cTn id="94" fill="hold">
+                            <p:stCondLst>
+                              <p:cond delay="0"/>
+                            </p:stCondLst>
+                            <p:childTnLst>
+                              <p:par>
+                                <p:cTn id="95" presetID="1" presetClass="entr" presetSubtype="0" fill="hold" grpId="0" nodeType="clickEffect">
+                                  <p:stCondLst>
+                                    <p:cond delay="0"/>
+                                  </p:stCondLst>
+                                  <p:childTnLst>
+                                    <p:set>
+                                      <p:cBhvr>
+                                        <p:cTn id="96" dur="1" fill="hold">
                                           <p:stCondLst>
                                             <p:cond delay="0"/>
                                           </p:stCondLst>
@@ -12862,6 +14107,12 @@
       <p:bldP spid="11" grpId="0" animBg="1"/>
       <p:bldP spid="12" grpId="0" animBg="1"/>
       <p:bldP spid="14" grpId="0"/>
+      <p:bldP spid="13" grpId="0" animBg="1"/>
+      <p:bldP spid="15" grpId="0" animBg="1"/>
+      <p:bldP spid="16" grpId="0" animBg="1"/>
+      <p:bldP spid="17" grpId="0" animBg="1"/>
+      <p:bldP spid="18" grpId="0" animBg="1"/>
+      <p:bldP spid="19" grpId="0" animBg="1"/>
     </p:bldLst>
   </p:timing>
 </p:sld>
@@ -15106,6 +16357,969 @@
       </p:grpSpPr>
       <p:sp>
         <p:nvSpPr>
+          <p:cNvPr id="2" name="Title 1"/>
+          <p:cNvSpPr>
+            <a:spLocks noGrp="1"/>
+          </p:cNvSpPr>
+          <p:nvPr>
+            <p:ph type="title"/>
+          </p:nvPr>
+        </p:nvSpPr>
+        <p:spPr>
+          <a:xfrm>
+            <a:off x="850955" y="111889"/>
+            <a:ext cx="8596668" cy="640466"/>
+          </a:xfrm>
+        </p:spPr>
+        <p:txBody>
+          <a:bodyPr/>
+          <a:lstStyle/>
+          <a:p>
+            <a:r>
+              <a:rPr lang="en-GB" dirty="0"/>
+              <a:t>Types added by Ts</a:t>
+            </a:r>
+          </a:p>
+        </p:txBody>
+      </p:sp>
+      <p:sp>
+        <p:nvSpPr>
+          <p:cNvPr id="4" name="Rectangle 3"/>
+          <p:cNvSpPr/>
+          <p:nvPr/>
+        </p:nvSpPr>
+        <p:spPr>
+          <a:xfrm flipH="1">
+            <a:off x="497711" y="1088020"/>
+            <a:ext cx="2511706" cy="696406"/>
+          </a:xfrm>
+          <a:prstGeom prst="rect">
+            <a:avLst/>
+          </a:prstGeom>
+          <a:solidFill>
+            <a:srgbClr val="7030A0"/>
+          </a:solidFill>
+        </p:spPr>
+        <p:style>
+          <a:lnRef idx="2">
+            <a:schemeClr val="accent1">
+              <a:shade val="50000"/>
+            </a:schemeClr>
+          </a:lnRef>
+          <a:fillRef idx="1">
+            <a:schemeClr val="accent1"/>
+          </a:fillRef>
+          <a:effectRef idx="0">
+            <a:schemeClr val="accent1"/>
+          </a:effectRef>
+          <a:fontRef idx="minor">
+            <a:schemeClr val="lt1"/>
+          </a:fontRef>
+        </p:style>
+        <p:txBody>
+          <a:bodyPr rtlCol="0" anchor="ctr"/>
+          <a:lstStyle/>
+          <a:p>
+            <a:pPr algn="ctr"/>
+            <a:r>
+              <a:rPr lang="en-GB" dirty="0" smtClean="0"/>
+              <a:t>Tuples</a:t>
+            </a:r>
+            <a:endParaRPr lang="en-GB" dirty="0"/>
+          </a:p>
+        </p:txBody>
+      </p:sp>
+      <p:sp>
+        <p:nvSpPr>
+          <p:cNvPr id="5" name="Rectangle 4"/>
+          <p:cNvSpPr/>
+          <p:nvPr/>
+        </p:nvSpPr>
+        <p:spPr>
+          <a:xfrm flipH="1">
+            <a:off x="3416460" y="1088019"/>
+            <a:ext cx="2511706" cy="614771"/>
+          </a:xfrm>
+          <a:prstGeom prst="rect">
+            <a:avLst/>
+          </a:prstGeom>
+          <a:solidFill>
+            <a:srgbClr val="D1B3E7"/>
+          </a:solidFill>
+        </p:spPr>
+        <p:style>
+          <a:lnRef idx="2">
+            <a:schemeClr val="accent1">
+              <a:shade val="50000"/>
+            </a:schemeClr>
+          </a:lnRef>
+          <a:fillRef idx="1">
+            <a:schemeClr val="accent1"/>
+          </a:fillRef>
+          <a:effectRef idx="0">
+            <a:schemeClr val="accent1"/>
+          </a:effectRef>
+          <a:fontRef idx="minor">
+            <a:schemeClr val="lt1"/>
+          </a:fontRef>
+        </p:style>
+        <p:txBody>
+          <a:bodyPr rtlCol="0" anchor="ctr"/>
+          <a:lstStyle/>
+          <a:p>
+            <a:pPr algn="ctr"/>
+            <a:r>
+              <a:rPr lang="en-GB" dirty="0">
+                <a:solidFill>
+                  <a:srgbClr val="7030A0"/>
+                </a:solidFill>
+              </a:rPr>
+              <a:t>[1,’hiii’]</a:t>
+            </a:r>
+            <a:endParaRPr lang="en-GB" dirty="0">
+              <a:solidFill>
+                <a:srgbClr val="7030A0"/>
+              </a:solidFill>
+            </a:endParaRPr>
+          </a:p>
+        </p:txBody>
+      </p:sp>
+      <p:sp>
+        <p:nvSpPr>
+          <p:cNvPr id="6" name="Rectangle 5"/>
+          <p:cNvSpPr/>
+          <p:nvPr/>
+        </p:nvSpPr>
+        <p:spPr>
+          <a:xfrm flipH="1">
+            <a:off x="6242608" y="1088019"/>
+            <a:ext cx="5123727" cy="696407"/>
+          </a:xfrm>
+          <a:prstGeom prst="rect">
+            <a:avLst/>
+          </a:prstGeom>
+          <a:solidFill>
+            <a:srgbClr val="D1B3E7"/>
+          </a:solidFill>
+        </p:spPr>
+        <p:style>
+          <a:lnRef idx="2">
+            <a:schemeClr val="accent1">
+              <a:shade val="50000"/>
+            </a:schemeClr>
+          </a:lnRef>
+          <a:fillRef idx="1">
+            <a:schemeClr val="accent1"/>
+          </a:fillRef>
+          <a:effectRef idx="0">
+            <a:schemeClr val="accent1"/>
+          </a:effectRef>
+          <a:fontRef idx="minor">
+            <a:schemeClr val="lt1"/>
+          </a:fontRef>
+        </p:style>
+        <p:txBody>
+          <a:bodyPr rtlCol="0" anchor="ctr"/>
+          <a:lstStyle/>
+          <a:p>
+            <a:pPr algn="ctr"/>
+            <a:r>
+              <a:rPr lang="en-IN" dirty="0" smtClean="0">
+                <a:solidFill>
+                  <a:srgbClr val="7131A1"/>
+                </a:solidFill>
+              </a:rPr>
+              <a:t>Fixed length fixed Types array</a:t>
+            </a:r>
+            <a:endParaRPr lang="en-GB" dirty="0">
+              <a:solidFill>
+                <a:srgbClr val="7131A1"/>
+              </a:solidFill>
+            </a:endParaRPr>
+          </a:p>
+        </p:txBody>
+      </p:sp>
+      <p:sp>
+        <p:nvSpPr>
+          <p:cNvPr id="7" name="Rectangle 6"/>
+          <p:cNvSpPr/>
+          <p:nvPr/>
+        </p:nvSpPr>
+        <p:spPr>
+          <a:xfrm flipH="1">
+            <a:off x="565226" y="1966478"/>
+            <a:ext cx="2511706" cy="486136"/>
+          </a:xfrm>
+          <a:prstGeom prst="rect">
+            <a:avLst/>
+          </a:prstGeom>
+          <a:solidFill>
+            <a:srgbClr val="7030A0"/>
+          </a:solidFill>
+        </p:spPr>
+        <p:style>
+          <a:lnRef idx="2">
+            <a:schemeClr val="accent1">
+              <a:shade val="50000"/>
+            </a:schemeClr>
+          </a:lnRef>
+          <a:fillRef idx="1">
+            <a:schemeClr val="accent1"/>
+          </a:fillRef>
+          <a:effectRef idx="0">
+            <a:schemeClr val="accent1"/>
+          </a:effectRef>
+          <a:fontRef idx="minor">
+            <a:schemeClr val="lt1"/>
+          </a:fontRef>
+        </p:style>
+        <p:txBody>
+          <a:bodyPr rtlCol="0" anchor="ctr"/>
+          <a:lstStyle/>
+          <a:p>
+            <a:pPr algn="ctr"/>
+            <a:r>
+              <a:rPr lang="en-GB" dirty="0" err="1" smtClean="0"/>
+              <a:t>Enums</a:t>
+            </a:r>
+            <a:endParaRPr lang="en-GB" dirty="0"/>
+          </a:p>
+        </p:txBody>
+      </p:sp>
+      <p:sp>
+        <p:nvSpPr>
+          <p:cNvPr id="8" name="Rectangle 7"/>
+          <p:cNvSpPr/>
+          <p:nvPr/>
+        </p:nvSpPr>
+        <p:spPr>
+          <a:xfrm flipH="1">
+            <a:off x="3393306" y="1911546"/>
+            <a:ext cx="2511706" cy="486136"/>
+          </a:xfrm>
+          <a:prstGeom prst="rect">
+            <a:avLst/>
+          </a:prstGeom>
+          <a:solidFill>
+            <a:srgbClr val="D1B3E7"/>
+          </a:solidFill>
+        </p:spPr>
+        <p:style>
+          <a:lnRef idx="2">
+            <a:schemeClr val="accent1">
+              <a:shade val="50000"/>
+            </a:schemeClr>
+          </a:lnRef>
+          <a:fillRef idx="1">
+            <a:schemeClr val="accent1"/>
+          </a:fillRef>
+          <a:effectRef idx="0">
+            <a:schemeClr val="accent1"/>
+          </a:effectRef>
+          <a:fontRef idx="minor">
+            <a:schemeClr val="lt1"/>
+          </a:fontRef>
+        </p:style>
+        <p:txBody>
+          <a:bodyPr rtlCol="0" anchor="ctr"/>
+          <a:lstStyle/>
+          <a:p>
+            <a:pPr algn="ctr"/>
+            <a:r>
+              <a:rPr lang="en-IN" dirty="0" err="1" smtClean="0">
+                <a:solidFill>
+                  <a:srgbClr val="7030A0"/>
+                </a:solidFill>
+              </a:rPr>
+              <a:t>enum</a:t>
+            </a:r>
+            <a:r>
+              <a:rPr lang="en-IN" dirty="0" smtClean="0">
+                <a:solidFill>
+                  <a:srgbClr val="7030A0"/>
+                </a:solidFill>
+              </a:rPr>
+              <a:t> {NEW,OLD}</a:t>
+            </a:r>
+            <a:endParaRPr lang="en-GB" dirty="0">
+              <a:solidFill>
+                <a:srgbClr val="7030A0"/>
+              </a:solidFill>
+            </a:endParaRPr>
+          </a:p>
+        </p:txBody>
+      </p:sp>
+      <p:sp>
+        <p:nvSpPr>
+          <p:cNvPr id="9" name="Rectangle 8"/>
+          <p:cNvSpPr/>
+          <p:nvPr/>
+        </p:nvSpPr>
+        <p:spPr>
+          <a:xfrm flipH="1">
+            <a:off x="6267683" y="1999864"/>
+            <a:ext cx="5123727" cy="486136"/>
+          </a:xfrm>
+          <a:prstGeom prst="rect">
+            <a:avLst/>
+          </a:prstGeom>
+          <a:solidFill>
+            <a:srgbClr val="D1B3E7"/>
+          </a:solidFill>
+        </p:spPr>
+        <p:style>
+          <a:lnRef idx="2">
+            <a:schemeClr val="accent1">
+              <a:shade val="50000"/>
+            </a:schemeClr>
+          </a:lnRef>
+          <a:fillRef idx="1">
+            <a:schemeClr val="accent1"/>
+          </a:fillRef>
+          <a:effectRef idx="0">
+            <a:schemeClr val="accent1"/>
+          </a:effectRef>
+          <a:fontRef idx="minor">
+            <a:schemeClr val="lt1"/>
+          </a:fontRef>
+        </p:style>
+        <p:txBody>
+          <a:bodyPr rtlCol="0" anchor="ctr"/>
+          <a:lstStyle/>
+          <a:p>
+            <a:pPr algn="ctr"/>
+            <a:r>
+              <a:rPr lang="en-GB" dirty="0" smtClean="0">
+                <a:solidFill>
+                  <a:srgbClr val="7131A1"/>
+                </a:solidFill>
+              </a:rPr>
+              <a:t>Added by TS :Automatically enumerated global constant identifiers</a:t>
+            </a:r>
+            <a:endParaRPr lang="en-GB" dirty="0">
+              <a:solidFill>
+                <a:srgbClr val="7131A1"/>
+              </a:solidFill>
+            </a:endParaRPr>
+          </a:p>
+        </p:txBody>
+      </p:sp>
+    </p:spTree>
+    <p:extLst>
+      <p:ext uri="{BB962C8B-B14F-4D97-AF65-F5344CB8AC3E}">
+        <p14:creationId xmlns:p14="http://schemas.microsoft.com/office/powerpoint/2010/main" val="142021295"/>
+      </p:ext>
+    </p:extLst>
+  </p:cSld>
+  <p:clrMapOvr>
+    <a:masterClrMapping/>
+  </p:clrMapOvr>
+  <p:timing>
+    <p:tnLst>
+      <p:par>
+        <p:cTn id="1" dur="indefinite" restart="never" nodeType="tmRoot">
+          <p:childTnLst>
+            <p:seq concurrent="1" nextAc="seek">
+              <p:cTn id="2" dur="indefinite" nodeType="mainSeq">
+                <p:childTnLst>
+                  <p:par>
+                    <p:cTn id="3" fill="hold">
+                      <p:stCondLst>
+                        <p:cond delay="indefinite"/>
+                      </p:stCondLst>
+                      <p:childTnLst>
+                        <p:par>
+                          <p:cTn id="4" fill="hold">
+                            <p:stCondLst>
+                              <p:cond delay="0"/>
+                            </p:stCondLst>
+                            <p:childTnLst>
+                              <p:par>
+                                <p:cTn id="5" presetID="2" presetClass="entr" presetSubtype="4" fill="hold" grpId="0" nodeType="clickEffect">
+                                  <p:stCondLst>
+                                    <p:cond delay="0"/>
+                                  </p:stCondLst>
+                                  <p:childTnLst>
+                                    <p:set>
+                                      <p:cBhvr>
+                                        <p:cTn id="6" dur="1" fill="hold">
+                                          <p:stCondLst>
+                                            <p:cond delay="0"/>
+                                          </p:stCondLst>
+                                        </p:cTn>
+                                        <p:tgtEl>
+                                          <p:spTgt spid="4"/>
+                                        </p:tgtEl>
+                                        <p:attrNameLst>
+                                          <p:attrName>style.visibility</p:attrName>
+                                        </p:attrNameLst>
+                                      </p:cBhvr>
+                                      <p:to>
+                                        <p:strVal val="visible"/>
+                                      </p:to>
+                                    </p:set>
+                                    <p:anim calcmode="lin" valueType="num">
+                                      <p:cBhvr additive="base">
+                                        <p:cTn id="7" dur="500" fill="hold"/>
+                                        <p:tgtEl>
+                                          <p:spTgt spid="4"/>
+                                        </p:tgtEl>
+                                        <p:attrNameLst>
+                                          <p:attrName>ppt_x</p:attrName>
+                                        </p:attrNameLst>
+                                      </p:cBhvr>
+                                      <p:tavLst>
+                                        <p:tav tm="0">
+                                          <p:val>
+                                            <p:strVal val="#ppt_x"/>
+                                          </p:val>
+                                        </p:tav>
+                                        <p:tav tm="100000">
+                                          <p:val>
+                                            <p:strVal val="#ppt_x"/>
+                                          </p:val>
+                                        </p:tav>
+                                      </p:tavLst>
+                                    </p:anim>
+                                    <p:anim calcmode="lin" valueType="num">
+                                      <p:cBhvr additive="base">
+                                        <p:cTn id="8" dur="500" fill="hold"/>
+                                        <p:tgtEl>
+                                          <p:spTgt spid="4"/>
+                                        </p:tgtEl>
+                                        <p:attrNameLst>
+                                          <p:attrName>ppt_y</p:attrName>
+                                        </p:attrNameLst>
+                                      </p:cBhvr>
+                                      <p:tavLst>
+                                        <p:tav tm="0">
+                                          <p:val>
+                                            <p:strVal val="1+#ppt_h/2"/>
+                                          </p:val>
+                                        </p:tav>
+                                        <p:tav tm="100000">
+                                          <p:val>
+                                            <p:strVal val="#ppt_y"/>
+                                          </p:val>
+                                        </p:tav>
+                                      </p:tavLst>
+                                    </p:anim>
+                                  </p:childTnLst>
+                                </p:cTn>
+                              </p:par>
+                            </p:childTnLst>
+                          </p:cTn>
+                        </p:par>
+                      </p:childTnLst>
+                    </p:cTn>
+                  </p:par>
+                  <p:par>
+                    <p:cTn id="9" fill="hold">
+                      <p:stCondLst>
+                        <p:cond delay="indefinite"/>
+                      </p:stCondLst>
+                      <p:childTnLst>
+                        <p:par>
+                          <p:cTn id="10" fill="hold">
+                            <p:stCondLst>
+                              <p:cond delay="0"/>
+                            </p:stCondLst>
+                            <p:childTnLst>
+                              <p:par>
+                                <p:cTn id="11" presetID="2" presetClass="entr" presetSubtype="4" fill="hold" grpId="0" nodeType="clickEffect">
+                                  <p:stCondLst>
+                                    <p:cond delay="0"/>
+                                  </p:stCondLst>
+                                  <p:childTnLst>
+                                    <p:set>
+                                      <p:cBhvr>
+                                        <p:cTn id="12" dur="1" fill="hold">
+                                          <p:stCondLst>
+                                            <p:cond delay="0"/>
+                                          </p:stCondLst>
+                                        </p:cTn>
+                                        <p:tgtEl>
+                                          <p:spTgt spid="5"/>
+                                        </p:tgtEl>
+                                        <p:attrNameLst>
+                                          <p:attrName>style.visibility</p:attrName>
+                                        </p:attrNameLst>
+                                      </p:cBhvr>
+                                      <p:to>
+                                        <p:strVal val="visible"/>
+                                      </p:to>
+                                    </p:set>
+                                    <p:anim calcmode="lin" valueType="num">
+                                      <p:cBhvr additive="base">
+                                        <p:cTn id="13" dur="500" fill="hold"/>
+                                        <p:tgtEl>
+                                          <p:spTgt spid="5"/>
+                                        </p:tgtEl>
+                                        <p:attrNameLst>
+                                          <p:attrName>ppt_x</p:attrName>
+                                        </p:attrNameLst>
+                                      </p:cBhvr>
+                                      <p:tavLst>
+                                        <p:tav tm="0">
+                                          <p:val>
+                                            <p:strVal val="#ppt_x"/>
+                                          </p:val>
+                                        </p:tav>
+                                        <p:tav tm="100000">
+                                          <p:val>
+                                            <p:strVal val="#ppt_x"/>
+                                          </p:val>
+                                        </p:tav>
+                                      </p:tavLst>
+                                    </p:anim>
+                                    <p:anim calcmode="lin" valueType="num">
+                                      <p:cBhvr additive="base">
+                                        <p:cTn id="14" dur="500" fill="hold"/>
+                                        <p:tgtEl>
+                                          <p:spTgt spid="5"/>
+                                        </p:tgtEl>
+                                        <p:attrNameLst>
+                                          <p:attrName>ppt_y</p:attrName>
+                                        </p:attrNameLst>
+                                      </p:cBhvr>
+                                      <p:tavLst>
+                                        <p:tav tm="0">
+                                          <p:val>
+                                            <p:strVal val="1+#ppt_h/2"/>
+                                          </p:val>
+                                        </p:tav>
+                                        <p:tav tm="100000">
+                                          <p:val>
+                                            <p:strVal val="#ppt_y"/>
+                                          </p:val>
+                                        </p:tav>
+                                      </p:tavLst>
+                                    </p:anim>
+                                  </p:childTnLst>
+                                </p:cTn>
+                              </p:par>
+                            </p:childTnLst>
+                          </p:cTn>
+                        </p:par>
+                      </p:childTnLst>
+                    </p:cTn>
+                  </p:par>
+                  <p:par>
+                    <p:cTn id="15" fill="hold">
+                      <p:stCondLst>
+                        <p:cond delay="indefinite"/>
+                      </p:stCondLst>
+                      <p:childTnLst>
+                        <p:par>
+                          <p:cTn id="16" fill="hold">
+                            <p:stCondLst>
+                              <p:cond delay="0"/>
+                            </p:stCondLst>
+                            <p:childTnLst>
+                              <p:par>
+                                <p:cTn id="17" presetID="2" presetClass="entr" presetSubtype="4" fill="hold" grpId="0" nodeType="clickEffect">
+                                  <p:stCondLst>
+                                    <p:cond delay="0"/>
+                                  </p:stCondLst>
+                                  <p:childTnLst>
+                                    <p:set>
+                                      <p:cBhvr>
+                                        <p:cTn id="18" dur="1" fill="hold">
+                                          <p:stCondLst>
+                                            <p:cond delay="0"/>
+                                          </p:stCondLst>
+                                        </p:cTn>
+                                        <p:tgtEl>
+                                          <p:spTgt spid="6"/>
+                                        </p:tgtEl>
+                                        <p:attrNameLst>
+                                          <p:attrName>style.visibility</p:attrName>
+                                        </p:attrNameLst>
+                                      </p:cBhvr>
+                                      <p:to>
+                                        <p:strVal val="visible"/>
+                                      </p:to>
+                                    </p:set>
+                                    <p:anim calcmode="lin" valueType="num">
+                                      <p:cBhvr additive="base">
+                                        <p:cTn id="19" dur="500" fill="hold"/>
+                                        <p:tgtEl>
+                                          <p:spTgt spid="6"/>
+                                        </p:tgtEl>
+                                        <p:attrNameLst>
+                                          <p:attrName>ppt_x</p:attrName>
+                                        </p:attrNameLst>
+                                      </p:cBhvr>
+                                      <p:tavLst>
+                                        <p:tav tm="0">
+                                          <p:val>
+                                            <p:strVal val="#ppt_x"/>
+                                          </p:val>
+                                        </p:tav>
+                                        <p:tav tm="100000">
+                                          <p:val>
+                                            <p:strVal val="#ppt_x"/>
+                                          </p:val>
+                                        </p:tav>
+                                      </p:tavLst>
+                                    </p:anim>
+                                    <p:anim calcmode="lin" valueType="num">
+                                      <p:cBhvr additive="base">
+                                        <p:cTn id="20" dur="500" fill="hold"/>
+                                        <p:tgtEl>
+                                          <p:spTgt spid="6"/>
+                                        </p:tgtEl>
+                                        <p:attrNameLst>
+                                          <p:attrName>ppt_y</p:attrName>
+                                        </p:attrNameLst>
+                                      </p:cBhvr>
+                                      <p:tavLst>
+                                        <p:tav tm="0">
+                                          <p:val>
+                                            <p:strVal val="1+#ppt_h/2"/>
+                                          </p:val>
+                                        </p:tav>
+                                        <p:tav tm="100000">
+                                          <p:val>
+                                            <p:strVal val="#ppt_y"/>
+                                          </p:val>
+                                        </p:tav>
+                                      </p:tavLst>
+                                    </p:anim>
+                                  </p:childTnLst>
+                                </p:cTn>
+                              </p:par>
+                            </p:childTnLst>
+                          </p:cTn>
+                        </p:par>
+                      </p:childTnLst>
+                    </p:cTn>
+                  </p:par>
+                  <p:par>
+                    <p:cTn id="21" fill="hold">
+                      <p:stCondLst>
+                        <p:cond delay="indefinite"/>
+                      </p:stCondLst>
+                      <p:childTnLst>
+                        <p:par>
+                          <p:cTn id="22" fill="hold">
+                            <p:stCondLst>
+                              <p:cond delay="0"/>
+                            </p:stCondLst>
+                            <p:childTnLst>
+                              <p:par>
+                                <p:cTn id="23" presetID="2" presetClass="entr" presetSubtype="4" fill="hold" grpId="0" nodeType="clickEffect">
+                                  <p:stCondLst>
+                                    <p:cond delay="0"/>
+                                  </p:stCondLst>
+                                  <p:childTnLst>
+                                    <p:set>
+                                      <p:cBhvr>
+                                        <p:cTn id="24" dur="1" fill="hold">
+                                          <p:stCondLst>
+                                            <p:cond delay="0"/>
+                                          </p:stCondLst>
+                                        </p:cTn>
+                                        <p:tgtEl>
+                                          <p:spTgt spid="7"/>
+                                        </p:tgtEl>
+                                        <p:attrNameLst>
+                                          <p:attrName>style.visibility</p:attrName>
+                                        </p:attrNameLst>
+                                      </p:cBhvr>
+                                      <p:to>
+                                        <p:strVal val="visible"/>
+                                      </p:to>
+                                    </p:set>
+                                    <p:anim calcmode="lin" valueType="num">
+                                      <p:cBhvr additive="base">
+                                        <p:cTn id="25" dur="500" fill="hold"/>
+                                        <p:tgtEl>
+                                          <p:spTgt spid="7"/>
+                                        </p:tgtEl>
+                                        <p:attrNameLst>
+                                          <p:attrName>ppt_x</p:attrName>
+                                        </p:attrNameLst>
+                                      </p:cBhvr>
+                                      <p:tavLst>
+                                        <p:tav tm="0">
+                                          <p:val>
+                                            <p:strVal val="#ppt_x"/>
+                                          </p:val>
+                                        </p:tav>
+                                        <p:tav tm="100000">
+                                          <p:val>
+                                            <p:strVal val="#ppt_x"/>
+                                          </p:val>
+                                        </p:tav>
+                                      </p:tavLst>
+                                    </p:anim>
+                                    <p:anim calcmode="lin" valueType="num">
+                                      <p:cBhvr additive="base">
+                                        <p:cTn id="26" dur="500" fill="hold"/>
+                                        <p:tgtEl>
+                                          <p:spTgt spid="7"/>
+                                        </p:tgtEl>
+                                        <p:attrNameLst>
+                                          <p:attrName>ppt_y</p:attrName>
+                                        </p:attrNameLst>
+                                      </p:cBhvr>
+                                      <p:tavLst>
+                                        <p:tav tm="0">
+                                          <p:val>
+                                            <p:strVal val="1+#ppt_h/2"/>
+                                          </p:val>
+                                        </p:tav>
+                                        <p:tav tm="100000">
+                                          <p:val>
+                                            <p:strVal val="#ppt_y"/>
+                                          </p:val>
+                                        </p:tav>
+                                      </p:tavLst>
+                                    </p:anim>
+                                  </p:childTnLst>
+                                </p:cTn>
+                              </p:par>
+                            </p:childTnLst>
+                          </p:cTn>
+                        </p:par>
+                      </p:childTnLst>
+                    </p:cTn>
+                  </p:par>
+                  <p:par>
+                    <p:cTn id="27" fill="hold">
+                      <p:stCondLst>
+                        <p:cond delay="indefinite"/>
+                      </p:stCondLst>
+                      <p:childTnLst>
+                        <p:par>
+                          <p:cTn id="28" fill="hold">
+                            <p:stCondLst>
+                              <p:cond delay="0"/>
+                            </p:stCondLst>
+                            <p:childTnLst>
+                              <p:par>
+                                <p:cTn id="29" presetID="2" presetClass="entr" presetSubtype="4" fill="hold" grpId="0" nodeType="clickEffect">
+                                  <p:stCondLst>
+                                    <p:cond delay="0"/>
+                                  </p:stCondLst>
+                                  <p:childTnLst>
+                                    <p:set>
+                                      <p:cBhvr>
+                                        <p:cTn id="30" dur="1" fill="hold">
+                                          <p:stCondLst>
+                                            <p:cond delay="0"/>
+                                          </p:stCondLst>
+                                        </p:cTn>
+                                        <p:tgtEl>
+                                          <p:spTgt spid="8"/>
+                                        </p:tgtEl>
+                                        <p:attrNameLst>
+                                          <p:attrName>style.visibility</p:attrName>
+                                        </p:attrNameLst>
+                                      </p:cBhvr>
+                                      <p:to>
+                                        <p:strVal val="visible"/>
+                                      </p:to>
+                                    </p:set>
+                                    <p:anim calcmode="lin" valueType="num">
+                                      <p:cBhvr additive="base">
+                                        <p:cTn id="31" dur="500" fill="hold"/>
+                                        <p:tgtEl>
+                                          <p:spTgt spid="8"/>
+                                        </p:tgtEl>
+                                        <p:attrNameLst>
+                                          <p:attrName>ppt_x</p:attrName>
+                                        </p:attrNameLst>
+                                      </p:cBhvr>
+                                      <p:tavLst>
+                                        <p:tav tm="0">
+                                          <p:val>
+                                            <p:strVal val="#ppt_x"/>
+                                          </p:val>
+                                        </p:tav>
+                                        <p:tav tm="100000">
+                                          <p:val>
+                                            <p:strVal val="#ppt_x"/>
+                                          </p:val>
+                                        </p:tav>
+                                      </p:tavLst>
+                                    </p:anim>
+                                    <p:anim calcmode="lin" valueType="num">
+                                      <p:cBhvr additive="base">
+                                        <p:cTn id="32" dur="500" fill="hold"/>
+                                        <p:tgtEl>
+                                          <p:spTgt spid="8"/>
+                                        </p:tgtEl>
+                                        <p:attrNameLst>
+                                          <p:attrName>ppt_y</p:attrName>
+                                        </p:attrNameLst>
+                                      </p:cBhvr>
+                                      <p:tavLst>
+                                        <p:tav tm="0">
+                                          <p:val>
+                                            <p:strVal val="1+#ppt_h/2"/>
+                                          </p:val>
+                                        </p:tav>
+                                        <p:tav tm="100000">
+                                          <p:val>
+                                            <p:strVal val="#ppt_y"/>
+                                          </p:val>
+                                        </p:tav>
+                                      </p:tavLst>
+                                    </p:anim>
+                                  </p:childTnLst>
+                                </p:cTn>
+                              </p:par>
+                            </p:childTnLst>
+                          </p:cTn>
+                        </p:par>
+                      </p:childTnLst>
+                    </p:cTn>
+                  </p:par>
+                  <p:par>
+                    <p:cTn id="33" fill="hold">
+                      <p:stCondLst>
+                        <p:cond delay="indefinite"/>
+                      </p:stCondLst>
+                      <p:childTnLst>
+                        <p:par>
+                          <p:cTn id="34" fill="hold">
+                            <p:stCondLst>
+                              <p:cond delay="0"/>
+                            </p:stCondLst>
+                            <p:childTnLst>
+                              <p:par>
+                                <p:cTn id="35" presetID="2" presetClass="entr" presetSubtype="4" fill="hold" grpId="0" nodeType="clickEffect">
+                                  <p:stCondLst>
+                                    <p:cond delay="0"/>
+                                  </p:stCondLst>
+                                  <p:childTnLst>
+                                    <p:set>
+                                      <p:cBhvr>
+                                        <p:cTn id="36" dur="1" fill="hold">
+                                          <p:stCondLst>
+                                            <p:cond delay="0"/>
+                                          </p:stCondLst>
+                                        </p:cTn>
+                                        <p:tgtEl>
+                                          <p:spTgt spid="9"/>
+                                        </p:tgtEl>
+                                        <p:attrNameLst>
+                                          <p:attrName>style.visibility</p:attrName>
+                                        </p:attrNameLst>
+                                      </p:cBhvr>
+                                      <p:to>
+                                        <p:strVal val="visible"/>
+                                      </p:to>
+                                    </p:set>
+                                    <p:anim calcmode="lin" valueType="num">
+                                      <p:cBhvr additive="base">
+                                        <p:cTn id="37" dur="500" fill="hold"/>
+                                        <p:tgtEl>
+                                          <p:spTgt spid="9"/>
+                                        </p:tgtEl>
+                                        <p:attrNameLst>
+                                          <p:attrName>ppt_x</p:attrName>
+                                        </p:attrNameLst>
+                                      </p:cBhvr>
+                                      <p:tavLst>
+                                        <p:tav tm="0">
+                                          <p:val>
+                                            <p:strVal val="#ppt_x"/>
+                                          </p:val>
+                                        </p:tav>
+                                        <p:tav tm="100000">
+                                          <p:val>
+                                            <p:strVal val="#ppt_x"/>
+                                          </p:val>
+                                        </p:tav>
+                                      </p:tavLst>
+                                    </p:anim>
+                                    <p:anim calcmode="lin" valueType="num">
+                                      <p:cBhvr additive="base">
+                                        <p:cTn id="38" dur="500" fill="hold"/>
+                                        <p:tgtEl>
+                                          <p:spTgt spid="9"/>
+                                        </p:tgtEl>
+                                        <p:attrNameLst>
+                                          <p:attrName>ppt_y</p:attrName>
+                                        </p:attrNameLst>
+                                      </p:cBhvr>
+                                      <p:tavLst>
+                                        <p:tav tm="0">
+                                          <p:val>
+                                            <p:strVal val="1+#ppt_h/2"/>
+                                          </p:val>
+                                        </p:tav>
+                                        <p:tav tm="100000">
+                                          <p:val>
+                                            <p:strVal val="#ppt_y"/>
+                                          </p:val>
+                                        </p:tav>
+                                      </p:tavLst>
+                                    </p:anim>
+                                  </p:childTnLst>
+                                </p:cTn>
+                              </p:par>
+                            </p:childTnLst>
+                          </p:cTn>
+                        </p:par>
+                      </p:childTnLst>
+                    </p:cTn>
+                  </p:par>
+                </p:childTnLst>
+              </p:cTn>
+              <p:prevCondLst>
+                <p:cond evt="onPrev" delay="0">
+                  <p:tgtEl>
+                    <p:sldTgt/>
+                  </p:tgtEl>
+                </p:cond>
+              </p:prevCondLst>
+              <p:nextCondLst>
+                <p:cond evt="onNext" delay="0">
+                  <p:tgtEl>
+                    <p:sldTgt/>
+                  </p:tgtEl>
+                </p:cond>
+              </p:nextCondLst>
+            </p:seq>
+          </p:childTnLst>
+        </p:cTn>
+      </p:par>
+    </p:tnLst>
+    <p:bldLst>
+      <p:bldP spid="4" grpId="0" animBg="1"/>
+      <p:bldP spid="5" grpId="0" animBg="1"/>
+      <p:bldP spid="6" grpId="0" animBg="1"/>
+      <p:bldP spid="7" grpId="0" animBg="1"/>
+      <p:bldP spid="8" grpId="0" animBg="1"/>
+      <p:bldP spid="9" grpId="0" animBg="1"/>
+    </p:bldLst>
+  </p:timing>
+</p:sld>
+</file>
+
+<file path=ppt/slides/slide19.xml><?xml version="1.0" encoding="utf-8"?>
+<p:sld xmlns:a="http://schemas.openxmlformats.org/drawingml/2006/main" xmlns:r="http://schemas.openxmlformats.org/officeDocument/2006/relationships" xmlns:p="http://schemas.openxmlformats.org/presentationml/2006/main">
+  <p:cSld>
+    <p:spTree>
+      <p:nvGrpSpPr>
+        <p:cNvPr id="1" name=""/>
+        <p:cNvGrpSpPr/>
+        <p:nvPr/>
+      </p:nvGrpSpPr>
+      <p:grpSpPr>
+        <a:xfrm>
+          <a:off x="0" y="0"/>
+          <a:ext cx="0" cy="0"/>
+          <a:chOff x="0" y="0"/>
+          <a:chExt cx="0" cy="0"/>
+        </a:xfrm>
+      </p:grpSpPr>
+      <p:sp>
+        <p:nvSpPr>
           <p:cNvPr id="3" name="Content Placeholder 2"/>
           <p:cNvSpPr>
             <a:spLocks noGrp="1"/>
@@ -15570,15 +17784,7 @@
                   <a:schemeClr val="tx1"/>
                 </a:solidFill>
               </a:rPr>
-              <a:t>Browsers can’t execute </a:t>
-            </a:r>
-            <a:r>
-              <a:rPr lang="en-GB" dirty="0" err="1" smtClean="0">
-                <a:solidFill>
-                  <a:schemeClr val="tx1"/>
-                </a:solidFill>
-              </a:rPr>
-              <a:t>Ts</a:t>
+              <a:t>Browsers can’t execute Ts</a:t>
             </a:r>
             <a:endParaRPr lang="en-GB" dirty="0">
               <a:solidFill>
@@ -16872,11 +19078,7 @@
           <a:p>
             <a:r>
               <a:rPr lang="en-GB" dirty="0" smtClean="0"/>
-              <a:t>Why </a:t>
-            </a:r>
-            <a:r>
-              <a:rPr lang="en-GB" dirty="0" err="1" smtClean="0"/>
-              <a:t>Ts</a:t>
+              <a:t>Why Ts</a:t>
             </a:r>
             <a:endParaRPr lang="en-GB" dirty="0"/>
           </a:p>
@@ -20345,11 +22547,7 @@
             </a:r>
             <a:r>
               <a:rPr lang="en-US" dirty="0" smtClean="0"/>
-              <a:t> – Helps to format </a:t>
-            </a:r>
-            <a:r>
-              <a:rPr lang="en-US" dirty="0" smtClean="0"/>
-              <a:t>code</a:t>
+              <a:t> – Helps to format code</a:t>
             </a:r>
           </a:p>
           <a:p>

</xml_diff>